<commit_message>
Updated ARKode documentation to reflect new timestepping modules
</commit_message>
<xml_diff>
--- a/doc/sundials/figures/sundials.figs.pptx
+++ b/doc/sundials/figures/sundials.figs.pptx
@@ -133,10 +133,6 @@
 </p:presentation>
 </file>
 
-<file path=ppt/revisionInfo.xml><?xml version="1.0" encoding="utf-8"?>
-<p1510:revInfo xmlns:a="http://schemas.openxmlformats.org/drawingml/2006/main" xmlns:r="http://schemas.openxmlformats.org/officeDocument/2006/relationships" xmlns:p1510="http://schemas.microsoft.com/office/powerpoint/2015/10/main"/>
-</file>
-
 <file path=ppt/notesMasters/notesMaster1.xml><?xml version="1.0" encoding="utf-8"?>
 <p:notesMaster xmlns:a="http://schemas.openxmlformats.org/drawingml/2006/main" xmlns:r="http://schemas.openxmlformats.org/officeDocument/2006/relationships" xmlns:p="http://schemas.openxmlformats.org/presentationml/2006/main">
   <p:cSld>
@@ -219,7 +215,7 @@
           <a:p>
             <a:fld id="{B0BC7C43-8675-4C93-9E70-937082A75193}" type="datetimeFigureOut">
               <a:rPr lang="en-US" smtClean="0"/>
-              <a:t>10/25/2017</a:t>
+              <a:t>3/12/18</a:t>
             </a:fld>
             <a:endParaRPr lang="en-US"/>
           </a:p>
@@ -1460,7 +1456,7 @@
             <a:fld id="{1D8BD707-D9CF-40AE-B4C6-C98DA3205C09}" type="datetimeFigureOut">
               <a:rPr lang="en-US" smtClean="0"/>
               <a:pPr/>
-              <a:t>10/25/2017</a:t>
+              <a:t>3/12/18</a:t>
             </a:fld>
             <a:endParaRPr lang="en-US"/>
           </a:p>
@@ -1625,7 +1621,7 @@
             <a:fld id="{1D8BD707-D9CF-40AE-B4C6-C98DA3205C09}" type="datetimeFigureOut">
               <a:rPr lang="en-US" smtClean="0"/>
               <a:pPr/>
-              <a:t>10/25/2017</a:t>
+              <a:t>3/12/18</a:t>
             </a:fld>
             <a:endParaRPr lang="en-US"/>
           </a:p>
@@ -1800,7 +1796,7 @@
             <a:fld id="{1D8BD707-D9CF-40AE-B4C6-C98DA3205C09}" type="datetimeFigureOut">
               <a:rPr lang="en-US" smtClean="0"/>
               <a:pPr/>
-              <a:t>10/25/2017</a:t>
+              <a:t>3/12/18</a:t>
             </a:fld>
             <a:endParaRPr lang="en-US"/>
           </a:p>
@@ -1965,7 +1961,7 @@
             <a:fld id="{1D8BD707-D9CF-40AE-B4C6-C98DA3205C09}" type="datetimeFigureOut">
               <a:rPr lang="en-US" smtClean="0"/>
               <a:pPr/>
-              <a:t>10/25/2017</a:t>
+              <a:t>3/12/18</a:t>
             </a:fld>
             <a:endParaRPr lang="en-US"/>
           </a:p>
@@ -2207,7 +2203,7 @@
             <a:fld id="{1D8BD707-D9CF-40AE-B4C6-C98DA3205C09}" type="datetimeFigureOut">
               <a:rPr lang="en-US" smtClean="0"/>
               <a:pPr/>
-              <a:t>10/25/2017</a:t>
+              <a:t>3/12/18</a:t>
             </a:fld>
             <a:endParaRPr lang="en-US"/>
           </a:p>
@@ -2489,7 +2485,7 @@
             <a:fld id="{1D8BD707-D9CF-40AE-B4C6-C98DA3205C09}" type="datetimeFigureOut">
               <a:rPr lang="en-US" smtClean="0"/>
               <a:pPr/>
-              <a:t>10/25/2017</a:t>
+              <a:t>3/12/18</a:t>
             </a:fld>
             <a:endParaRPr lang="en-US"/>
           </a:p>
@@ -2905,7 +2901,7 @@
             <a:fld id="{1D8BD707-D9CF-40AE-B4C6-C98DA3205C09}" type="datetimeFigureOut">
               <a:rPr lang="en-US" smtClean="0"/>
               <a:pPr/>
-              <a:t>10/25/2017</a:t>
+              <a:t>3/12/18</a:t>
             </a:fld>
             <a:endParaRPr lang="en-US"/>
           </a:p>
@@ -3019,7 +3015,7 @@
             <a:fld id="{1D8BD707-D9CF-40AE-B4C6-C98DA3205C09}" type="datetimeFigureOut">
               <a:rPr lang="en-US" smtClean="0"/>
               <a:pPr/>
-              <a:t>10/25/2017</a:t>
+              <a:t>3/12/18</a:t>
             </a:fld>
             <a:endParaRPr lang="en-US"/>
           </a:p>
@@ -3111,7 +3107,7 @@
             <a:fld id="{1D8BD707-D9CF-40AE-B4C6-C98DA3205C09}" type="datetimeFigureOut">
               <a:rPr lang="en-US" smtClean="0"/>
               <a:pPr/>
-              <a:t>10/25/2017</a:t>
+              <a:t>3/12/18</a:t>
             </a:fld>
             <a:endParaRPr lang="en-US"/>
           </a:p>
@@ -3383,7 +3379,7 @@
             <a:fld id="{1D8BD707-D9CF-40AE-B4C6-C98DA3205C09}" type="datetimeFigureOut">
               <a:rPr lang="en-US" smtClean="0"/>
               <a:pPr/>
-              <a:t>10/25/2017</a:t>
+              <a:t>3/12/18</a:t>
             </a:fld>
             <a:endParaRPr lang="en-US"/>
           </a:p>
@@ -3632,7 +3628,7 @@
             <a:fld id="{1D8BD707-D9CF-40AE-B4C6-C98DA3205C09}" type="datetimeFigureOut">
               <a:rPr lang="en-US" smtClean="0"/>
               <a:pPr/>
-              <a:t>10/25/2017</a:t>
+              <a:t>3/12/18</a:t>
             </a:fld>
             <a:endParaRPr lang="en-US"/>
           </a:p>
@@ -3840,7 +3836,7 @@
             <a:fld id="{1D8BD707-D9CF-40AE-B4C6-C98DA3205C09}" type="datetimeFigureOut">
               <a:rPr lang="en-US" smtClean="0"/>
               <a:pPr/>
-              <a:t>10/25/2017</a:t>
+              <a:t>3/12/18</a:t>
             </a:fld>
             <a:endParaRPr lang="en-US"/>
           </a:p>
@@ -16084,7 +16080,7 @@
         </p:nvSpPr>
         <p:spPr>
           <a:xfrm>
-            <a:off x="2084271" y="317718"/>
+            <a:off x="1499903" y="294812"/>
             <a:ext cx="1066800" cy="381000"/>
           </a:xfrm>
           <a:prstGeom prst="roundRect">
@@ -16145,7 +16141,7 @@
         </p:nvSpPr>
         <p:spPr>
           <a:xfrm>
-            <a:off x="3798107" y="338292"/>
+            <a:off x="3770004" y="313646"/>
             <a:ext cx="914400" cy="342900"/>
           </a:xfrm>
           <a:prstGeom prst="roundRect">
@@ -16206,7 +16202,7 @@
         </p:nvSpPr>
         <p:spPr>
           <a:xfrm>
-            <a:off x="390828" y="948895"/>
+            <a:off x="440157" y="2002777"/>
             <a:ext cx="2119492" cy="494493"/>
           </a:xfrm>
           <a:prstGeom prst="rect">
@@ -16267,13 +16263,14 @@
           <p:cNvCxnSpPr>
             <a:cxnSpLocks/>
             <a:stCxn id="11" idx="3"/>
+            <a:endCxn id="86" idx="0"/>
           </p:cNvCxnSpPr>
           <p:nvPr/>
         </p:nvCxnSpPr>
         <p:spPr>
           <a:xfrm>
-            <a:off x="4712507" y="509742"/>
-            <a:ext cx="2475524" cy="239865"/>
+            <a:off x="4684404" y="485096"/>
+            <a:ext cx="2570702" cy="1319024"/>
           </a:xfrm>
           <a:prstGeom prst="bentConnector2">
             <a:avLst/>
@@ -16308,7 +16305,7 @@
         </p:nvSpPr>
         <p:spPr>
           <a:xfrm>
-            <a:off x="5166083" y="4646872"/>
+            <a:off x="5215412" y="5700754"/>
             <a:ext cx="2823394" cy="845691"/>
           </a:xfrm>
           <a:prstGeom prst="rect">
@@ -16363,7 +16360,7 @@
         </p:nvSpPr>
         <p:spPr>
           <a:xfrm>
-            <a:off x="5311288" y="5043067"/>
+            <a:off x="5360617" y="6096949"/>
             <a:ext cx="1021828" cy="242358"/>
           </a:xfrm>
           <a:prstGeom prst="roundRect">
@@ -16420,7 +16417,7 @@
         </p:nvSpPr>
         <p:spPr>
           <a:xfrm>
-            <a:off x="6694197" y="5043067"/>
+            <a:off x="6743526" y="6096949"/>
             <a:ext cx="1119515" cy="242358"/>
           </a:xfrm>
           <a:prstGeom prst="roundRect">
@@ -16469,66 +16466,6 @@
           </a:p>
         </p:txBody>
       </p:sp>
-      <p:cxnSp>
-        <p:nvCxnSpPr>
-          <p:cNvPr id="62" name="Straight Connector 61"/>
-          <p:cNvCxnSpPr/>
-          <p:nvPr/>
-        </p:nvCxnSpPr>
-        <p:spPr>
-          <a:xfrm>
-            <a:off x="0" y="5867400"/>
-            <a:ext cx="9144000" cy="0"/>
-          </a:xfrm>
-          <a:prstGeom prst="line">
-            <a:avLst/>
-          </a:prstGeom>
-        </p:spPr>
-        <p:style>
-          <a:lnRef idx="1">
-            <a:schemeClr val="accent1"/>
-          </a:lnRef>
-          <a:fillRef idx="0">
-            <a:schemeClr val="accent1"/>
-          </a:fillRef>
-          <a:effectRef idx="0">
-            <a:schemeClr val="accent1"/>
-          </a:effectRef>
-          <a:fontRef idx="minor">
-            <a:schemeClr val="tx1"/>
-          </a:fontRef>
-        </p:style>
-      </p:cxnSp>
-      <p:sp>
-        <p:nvSpPr>
-          <p:cNvPr id="65" name="TextBox 64"/>
-          <p:cNvSpPr txBox="1"/>
-          <p:nvPr/>
-        </p:nvSpPr>
-        <p:spPr>
-          <a:xfrm>
-            <a:off x="3505200" y="5867400"/>
-            <a:ext cx="2237815" cy="369332"/>
-          </a:xfrm>
-          <a:prstGeom prst="rect">
-            <a:avLst/>
-          </a:prstGeom>
-          <a:noFill/>
-        </p:spPr>
-        <p:txBody>
-          <a:bodyPr wrap="square" rtlCol="0">
-            <a:spAutoFit/>
-          </a:bodyPr>
-          <a:lstStyle/>
-          <a:p>
-            <a:pPr algn="ctr"/>
-            <a:r>
-              <a:rPr lang="en-US" dirty="0"/>
-              <a:t>Cut Here</a:t>
-            </a:r>
-          </a:p>
-        </p:txBody>
-      </p:sp>
       <p:sp>
         <p:nvSpPr>
           <p:cNvPr id="102" name="Rectangle 101"/>
@@ -16537,7 +16474,7 @@
         </p:nvSpPr>
         <p:spPr>
           <a:xfrm>
-            <a:off x="5216067" y="2705362"/>
+            <a:off x="5265396" y="3759244"/>
             <a:ext cx="2602229" cy="1729573"/>
           </a:xfrm>
           <a:prstGeom prst="rect">
@@ -16592,7 +16529,7 @@
         </p:nvSpPr>
         <p:spPr>
           <a:xfrm>
-            <a:off x="6446494" y="3568568"/>
+            <a:off x="6495823" y="4622450"/>
             <a:ext cx="991873" cy="242358"/>
           </a:xfrm>
           <a:prstGeom prst="roundRect">
@@ -16649,7 +16586,7 @@
         </p:nvSpPr>
         <p:spPr>
           <a:xfrm>
-            <a:off x="5409198" y="3568568"/>
+            <a:off x="5458527" y="4622450"/>
             <a:ext cx="809608" cy="242358"/>
           </a:xfrm>
           <a:prstGeom prst="roundRect">
@@ -16706,7 +16643,7 @@
         </p:nvSpPr>
         <p:spPr>
           <a:xfrm>
-            <a:off x="5385200" y="4024325"/>
+            <a:off x="5434529" y="5078207"/>
             <a:ext cx="952500" cy="242358"/>
           </a:xfrm>
           <a:prstGeom prst="roundRect">
@@ -16771,7 +16708,7 @@
         </p:nvSpPr>
         <p:spPr>
           <a:xfrm>
-            <a:off x="6532343" y="4007461"/>
+            <a:off x="6581672" y="5061343"/>
             <a:ext cx="771924" cy="242358"/>
           </a:xfrm>
           <a:prstGeom prst="roundRect">
@@ -16836,7 +16773,7 @@
         </p:nvSpPr>
         <p:spPr>
           <a:xfrm>
-            <a:off x="6496716" y="3167837"/>
+            <a:off x="6546045" y="4221719"/>
             <a:ext cx="891430" cy="242358"/>
           </a:xfrm>
           <a:prstGeom prst="roundRect">
@@ -16895,7 +16832,7 @@
         </p:nvCxnSpPr>
         <p:spPr>
           <a:xfrm rot="16200000" flipH="1">
-            <a:off x="-943798" y="2914738"/>
+            <a:off x="-894469" y="3968620"/>
             <a:ext cx="3074567" cy="150431"/>
           </a:xfrm>
           <a:prstGeom prst="bentConnector2">
@@ -16933,7 +16870,7 @@
         </p:nvCxnSpPr>
         <p:spPr>
           <a:xfrm rot="16200000" flipH="1">
-            <a:off x="25503" y="1899435"/>
+            <a:off x="74832" y="2953317"/>
             <a:ext cx="1084232" cy="196018"/>
           </a:xfrm>
           <a:prstGeom prst="bentConnector2">
@@ -16969,7 +16906,7 @@
         </p:nvSpPr>
         <p:spPr>
           <a:xfrm>
-            <a:off x="2866903" y="952762"/>
+            <a:off x="2916232" y="2006644"/>
             <a:ext cx="2357020" cy="494493"/>
           </a:xfrm>
           <a:prstGeom prst="rect">
@@ -17028,56 +16965,14 @@
         <p:nvCxnSpPr>
           <p:cNvPr id="116" name="Elbow Connector 115"/>
           <p:cNvCxnSpPr>
-            <a:stCxn id="11" idx="2"/>
-            <a:endCxn id="47" idx="0"/>
+            <a:cxnSpLocks/>
           </p:cNvCxnSpPr>
           <p:nvPr/>
         </p:nvCxnSpPr>
         <p:spPr>
           <a:xfrm rot="5400000">
-            <a:off x="2719090" y="-587323"/>
-            <a:ext cx="267703" cy="2804733"/>
-          </a:xfrm>
-          <a:prstGeom prst="bentConnector3">
-            <a:avLst>
-              <a:gd name="adj1" fmla="val 50000"/>
-            </a:avLst>
-          </a:prstGeom>
-          <a:ln w="12700">
-            <a:solidFill>
-              <a:schemeClr val="tx2"/>
-            </a:solidFill>
-            <a:tailEnd type="triangle"/>
-          </a:ln>
-        </p:spPr>
-        <p:style>
-          <a:lnRef idx="1">
-            <a:schemeClr val="accent1"/>
-          </a:lnRef>
-          <a:fillRef idx="0">
-            <a:schemeClr val="accent1"/>
-          </a:fillRef>
-          <a:effectRef idx="0">
-            <a:schemeClr val="accent1"/>
-          </a:effectRef>
-          <a:fontRef idx="minor">
-            <a:schemeClr val="tx1"/>
-          </a:fontRef>
-        </p:style>
-      </p:cxnSp>
-      <p:cxnSp>
-        <p:nvCxnSpPr>
-          <p:cNvPr id="117" name="Elbow Connector 116"/>
-          <p:cNvCxnSpPr>
-            <a:stCxn id="11" idx="2"/>
-            <a:endCxn id="115" idx="0"/>
-          </p:cNvCxnSpPr>
-          <p:nvPr/>
-        </p:nvCxnSpPr>
-        <p:spPr>
-          <a:xfrm rot="5400000">
-            <a:off x="4014575" y="712030"/>
-            <a:ext cx="271570" cy="209894"/>
+            <a:off x="3706971" y="703520"/>
+            <a:ext cx="302337" cy="200614"/>
           </a:xfrm>
           <a:prstGeom prst="bentConnector3">
             <a:avLst>
@@ -17116,7 +17011,7 @@
         </p:nvCxnSpPr>
         <p:spPr>
           <a:xfrm rot="16200000" flipH="1">
-            <a:off x="2860703" y="2764338"/>
+            <a:off x="2910032" y="3818220"/>
             <a:ext cx="3622552" cy="988208"/>
           </a:xfrm>
           <a:prstGeom prst="bentConnector2">
@@ -17154,7 +17049,7 @@
         </p:nvCxnSpPr>
         <p:spPr>
           <a:xfrm rot="16200000" flipH="1">
-            <a:off x="3721727" y="2075808"/>
+            <a:off x="3771056" y="3129690"/>
             <a:ext cx="2119027" cy="869653"/>
           </a:xfrm>
           <a:prstGeom prst="bentConnector2">
@@ -17192,9 +17087,9 @@
           <p:nvPr/>
         </p:nvCxnSpPr>
         <p:spPr>
-          <a:xfrm>
-            <a:off x="3151071" y="508218"/>
-            <a:ext cx="647036" cy="1524"/>
+          <a:xfrm flipV="1">
+            <a:off x="2566703" y="485096"/>
+            <a:ext cx="1203301" cy="216"/>
           </a:xfrm>
           <a:prstGeom prst="straightConnector1">
             <a:avLst/>
@@ -17232,7 +17127,7 @@
         </p:nvGrpSpPr>
         <p:grpSpPr>
           <a:xfrm>
-            <a:off x="5443836" y="750238"/>
+            <a:off x="5493165" y="1804120"/>
             <a:ext cx="3523881" cy="1645177"/>
             <a:chOff x="613990" y="1934106"/>
             <a:chExt cx="3523881" cy="1645177"/>
@@ -17874,7 +17769,7 @@
         </p:nvGrpSpPr>
         <p:grpSpPr>
           <a:xfrm>
-            <a:off x="683045" y="1725728"/>
+            <a:off x="732374" y="2779610"/>
             <a:ext cx="3110654" cy="1640945"/>
             <a:chOff x="4928085" y="1867952"/>
             <a:chExt cx="3110654" cy="1640945"/>
@@ -18370,7 +18265,7 @@
         </p:nvGrpSpPr>
         <p:grpSpPr>
           <a:xfrm>
-            <a:off x="668701" y="3561912"/>
+            <a:off x="718030" y="4615794"/>
             <a:ext cx="3096707" cy="1930651"/>
             <a:chOff x="668701" y="3561912"/>
             <a:chExt cx="3096707" cy="1930651"/>
@@ -18810,6 +18705,283 @@
           </p:txBody>
         </p:sp>
       </p:grpSp>
+      <p:sp>
+        <p:nvSpPr>
+          <p:cNvPr id="58" name="Rectangle 57">
+            <a:extLst>
+              <a:ext uri="{FF2B5EF4-FFF2-40B4-BE49-F238E27FC236}">
+                <a16:creationId xmlns:a16="http://schemas.microsoft.com/office/drawing/2014/main" id="{B5487952-64F5-9641-89B0-68B0D916C0B5}"/>
+              </a:ext>
+            </a:extLst>
+          </p:cNvPr>
+          <p:cNvSpPr/>
+          <p:nvPr/>
+        </p:nvSpPr>
+        <p:spPr>
+          <a:xfrm>
+            <a:off x="1270640" y="958859"/>
+            <a:ext cx="2823394" cy="845691"/>
+          </a:xfrm>
+          <a:prstGeom prst="rect">
+            <a:avLst/>
+          </a:prstGeom>
+          <a:solidFill>
+            <a:schemeClr val="accent3">
+              <a:lumMod val="40000"/>
+              <a:lumOff val="60000"/>
+            </a:schemeClr>
+          </a:solidFill>
+        </p:spPr>
+        <p:style>
+          <a:lnRef idx="2">
+            <a:schemeClr val="accent1">
+              <a:shade val="50000"/>
+            </a:schemeClr>
+          </a:lnRef>
+          <a:fillRef idx="1">
+            <a:schemeClr val="accent1"/>
+          </a:fillRef>
+          <a:effectRef idx="0">
+            <a:schemeClr val="accent1"/>
+          </a:effectRef>
+          <a:fontRef idx="minor">
+            <a:schemeClr val="lt1"/>
+          </a:fontRef>
+        </p:style>
+        <p:txBody>
+          <a:bodyPr rtlCol="0" anchor="t" anchorCtr="0"/>
+          <a:lstStyle/>
+          <a:p>
+            <a:r>
+              <a:rPr lang="en-US" sz="1200" b="1" dirty="0">
+                <a:solidFill>
+                  <a:schemeClr val="tx1"/>
+                </a:solidFill>
+                <a:latin typeface="Arial" panose="020B0604020202020204" pitchFamily="34" charset="0"/>
+                <a:ea typeface="Cambria Math" panose="02040503050406030204" pitchFamily="18" charset="0"/>
+                <a:cs typeface="Arial" panose="020B0604020202020204" pitchFamily="34" charset="0"/>
+              </a:rPr>
+              <a:t>TIMESTEPPING MODULES</a:t>
+            </a:r>
+          </a:p>
+        </p:txBody>
+      </p:sp>
+      <p:sp>
+        <p:nvSpPr>
+          <p:cNvPr id="59" name="Rounded Rectangle 58">
+            <a:extLst>
+              <a:ext uri="{FF2B5EF4-FFF2-40B4-BE49-F238E27FC236}">
+                <a16:creationId xmlns:a16="http://schemas.microsoft.com/office/drawing/2014/main" id="{E3AA7084-04F6-FA49-9B97-E008EDDB3BE5}"/>
+              </a:ext>
+            </a:extLst>
+          </p:cNvPr>
+          <p:cNvSpPr/>
+          <p:nvPr/>
+        </p:nvSpPr>
+        <p:spPr>
+          <a:xfrm>
+            <a:off x="1596924" y="1350021"/>
+            <a:ext cx="1021828" cy="242358"/>
+          </a:xfrm>
+          <a:prstGeom prst="roundRect">
+            <a:avLst/>
+          </a:prstGeom>
+          <a:solidFill>
+            <a:schemeClr val="tx2">
+              <a:lumMod val="20000"/>
+              <a:lumOff val="80000"/>
+            </a:schemeClr>
+          </a:solidFill>
+          <a:ln w="22225"/>
+        </p:spPr>
+        <p:style>
+          <a:lnRef idx="2">
+            <a:schemeClr val="accent1">
+              <a:shade val="50000"/>
+            </a:schemeClr>
+          </a:lnRef>
+          <a:fillRef idx="1">
+            <a:schemeClr val="accent1"/>
+          </a:fillRef>
+          <a:effectRef idx="0">
+            <a:schemeClr val="accent1"/>
+          </a:effectRef>
+          <a:fontRef idx="minor">
+            <a:schemeClr val="lt1"/>
+          </a:fontRef>
+        </p:style>
+        <p:txBody>
+          <a:bodyPr rtlCol="0" anchor="ctr"/>
+          <a:lstStyle/>
+          <a:p>
+            <a:pPr algn="ctr"/>
+            <a:r>
+              <a:rPr lang="en-US" sz="1000" b="1" dirty="0">
+                <a:solidFill>
+                  <a:schemeClr val="tx1"/>
+                </a:solidFill>
+                <a:latin typeface="Arial" panose="020B0604020202020204" pitchFamily="34" charset="0"/>
+                <a:ea typeface="Cambria Math" panose="02040503050406030204" pitchFamily="18" charset="0"/>
+                <a:cs typeface="Arial" panose="020B0604020202020204" pitchFamily="34" charset="0"/>
+              </a:rPr>
+              <a:t>ARKSTEP</a:t>
+            </a:r>
+          </a:p>
+        </p:txBody>
+      </p:sp>
+      <p:sp>
+        <p:nvSpPr>
+          <p:cNvPr id="60" name="Rounded Rectangle 59">
+            <a:extLst>
+              <a:ext uri="{FF2B5EF4-FFF2-40B4-BE49-F238E27FC236}">
+                <a16:creationId xmlns:a16="http://schemas.microsoft.com/office/drawing/2014/main" id="{4DF15567-F85A-DB49-B178-A677436030CF}"/>
+              </a:ext>
+            </a:extLst>
+          </p:cNvPr>
+          <p:cNvSpPr/>
+          <p:nvPr/>
+        </p:nvSpPr>
+        <p:spPr>
+          <a:xfrm>
+            <a:off x="2856688" y="1338429"/>
+            <a:ext cx="1021828" cy="242358"/>
+          </a:xfrm>
+          <a:prstGeom prst="roundRect">
+            <a:avLst/>
+          </a:prstGeom>
+          <a:solidFill>
+            <a:schemeClr val="tx2">
+              <a:lumMod val="20000"/>
+              <a:lumOff val="80000"/>
+            </a:schemeClr>
+          </a:solidFill>
+          <a:ln w="22225"/>
+        </p:spPr>
+        <p:style>
+          <a:lnRef idx="2">
+            <a:schemeClr val="accent1">
+              <a:shade val="50000"/>
+            </a:schemeClr>
+          </a:lnRef>
+          <a:fillRef idx="1">
+            <a:schemeClr val="accent1"/>
+          </a:fillRef>
+          <a:effectRef idx="0">
+            <a:schemeClr val="accent1"/>
+          </a:effectRef>
+          <a:fontRef idx="minor">
+            <a:schemeClr val="lt1"/>
+          </a:fontRef>
+        </p:style>
+        <p:txBody>
+          <a:bodyPr rtlCol="0" anchor="ctr"/>
+          <a:lstStyle/>
+          <a:p>
+            <a:pPr algn="ctr"/>
+            <a:r>
+              <a:rPr lang="en-US" sz="1000" b="1" dirty="0">
+                <a:solidFill>
+                  <a:schemeClr val="tx1"/>
+                </a:solidFill>
+                <a:latin typeface="Arial" panose="020B0604020202020204" pitchFamily="34" charset="0"/>
+                <a:ea typeface="Cambria Math" panose="02040503050406030204" pitchFamily="18" charset="0"/>
+                <a:cs typeface="Arial" panose="020B0604020202020204" pitchFamily="34" charset="0"/>
+              </a:rPr>
+              <a:t>ERKSTEP</a:t>
+            </a:r>
+          </a:p>
+        </p:txBody>
+      </p:sp>
+      <p:cxnSp>
+        <p:nvCxnSpPr>
+          <p:cNvPr id="67" name="Elbow Connector 66">
+            <a:extLst>
+              <a:ext uri="{FF2B5EF4-FFF2-40B4-BE49-F238E27FC236}">
+                <a16:creationId xmlns:a16="http://schemas.microsoft.com/office/drawing/2014/main" id="{D1570469-06D0-D145-A4CE-085D57AE9F90}"/>
+              </a:ext>
+            </a:extLst>
+          </p:cNvPr>
+          <p:cNvCxnSpPr>
+            <a:cxnSpLocks/>
+            <a:endCxn id="47" idx="3"/>
+          </p:cNvCxnSpPr>
+          <p:nvPr/>
+        </p:nvCxnSpPr>
+        <p:spPr>
+          <a:xfrm rot="5400000">
+            <a:off x="2436502" y="1931999"/>
+            <a:ext cx="441172" cy="194878"/>
+          </a:xfrm>
+          <a:prstGeom prst="bentConnector2">
+            <a:avLst/>
+          </a:prstGeom>
+          <a:ln w="12700">
+            <a:solidFill>
+              <a:schemeClr val="tx2"/>
+            </a:solidFill>
+            <a:tailEnd type="triangle"/>
+          </a:ln>
+        </p:spPr>
+        <p:style>
+          <a:lnRef idx="1">
+            <a:schemeClr val="accent1"/>
+          </a:lnRef>
+          <a:fillRef idx="0">
+            <a:schemeClr val="accent1"/>
+          </a:fillRef>
+          <a:effectRef idx="0">
+            <a:schemeClr val="accent1"/>
+          </a:effectRef>
+          <a:fontRef idx="minor">
+            <a:schemeClr val="tx1"/>
+          </a:fontRef>
+        </p:style>
+      </p:cxnSp>
+      <p:cxnSp>
+        <p:nvCxnSpPr>
+          <p:cNvPr id="68" name="Elbow Connector 67">
+            <a:extLst>
+              <a:ext uri="{FF2B5EF4-FFF2-40B4-BE49-F238E27FC236}">
+                <a16:creationId xmlns:a16="http://schemas.microsoft.com/office/drawing/2014/main" id="{3E997FAA-1290-8547-A47C-50DC0771C6E2}"/>
+              </a:ext>
+            </a:extLst>
+          </p:cNvPr>
+          <p:cNvCxnSpPr>
+            <a:cxnSpLocks/>
+            <a:endCxn id="115" idx="1"/>
+          </p:cNvCxnSpPr>
+          <p:nvPr/>
+        </p:nvCxnSpPr>
+        <p:spPr>
+          <a:xfrm rot="16200000" flipH="1">
+            <a:off x="2635445" y="1973104"/>
+            <a:ext cx="442486" cy="119088"/>
+          </a:xfrm>
+          <a:prstGeom prst="bentConnector2">
+            <a:avLst/>
+          </a:prstGeom>
+          <a:ln w="12700">
+            <a:solidFill>
+              <a:schemeClr val="tx2"/>
+            </a:solidFill>
+            <a:tailEnd type="triangle"/>
+          </a:ln>
+        </p:spPr>
+        <p:style>
+          <a:lnRef idx="1">
+            <a:schemeClr val="accent1"/>
+          </a:lnRef>
+          <a:fillRef idx="0">
+            <a:schemeClr val="accent1"/>
+          </a:fillRef>
+          <a:effectRef idx="0">
+            <a:schemeClr val="accent1"/>
+          </a:effectRef>
+          <a:fontRef idx="minor">
+            <a:schemeClr val="tx1"/>
+          </a:fontRef>
+        </p:style>
+      </p:cxnSp>
     </p:spTree>
     <p:extLst>
       <p:ext uri="{BB962C8B-B14F-4D97-AF65-F5344CB8AC3E}">

</xml_diff>